<commit_message>
some edits to the writeup, started putting together poster
</commit_message>
<xml_diff>
--- a/project_deliverables/Figs.pptx
+++ b/project_deliverables/Figs.pptx
@@ -192,7 +192,7 @@
           <a:p>
             <a:fld id="{178264EE-90D0-CB41-A2CB-101A3BB5E18A}" type="datetimeFigureOut">
               <a:rPr lang="en-US" smtClean="0"/>
-              <a:t>5/28/16</a:t>
+              <a:t>5/29/16</a:t>
             </a:fld>
             <a:endParaRPr lang="en-US"/>
           </a:p>
@@ -725,7 +725,7 @@
           <a:p>
             <a:fld id="{CDEDE331-6CCF-8044-89C3-DFD0750C62A8}" type="datetimeFigureOut">
               <a:rPr lang="en-US" smtClean="0"/>
-              <a:t>5/28/16</a:t>
+              <a:t>5/29/16</a:t>
             </a:fld>
             <a:endParaRPr lang="en-US"/>
           </a:p>
@@ -895,7 +895,7 @@
           <a:p>
             <a:fld id="{CDEDE331-6CCF-8044-89C3-DFD0750C62A8}" type="datetimeFigureOut">
               <a:rPr lang="en-US" smtClean="0"/>
-              <a:t>5/28/16</a:t>
+              <a:t>5/29/16</a:t>
             </a:fld>
             <a:endParaRPr lang="en-US"/>
           </a:p>
@@ -1075,7 +1075,7 @@
           <a:p>
             <a:fld id="{CDEDE331-6CCF-8044-89C3-DFD0750C62A8}" type="datetimeFigureOut">
               <a:rPr lang="en-US" smtClean="0"/>
-              <a:t>5/28/16</a:t>
+              <a:t>5/29/16</a:t>
             </a:fld>
             <a:endParaRPr lang="en-US"/>
           </a:p>
@@ -1245,7 +1245,7 @@
           <a:p>
             <a:fld id="{CDEDE331-6CCF-8044-89C3-DFD0750C62A8}" type="datetimeFigureOut">
               <a:rPr lang="en-US" smtClean="0"/>
-              <a:t>5/28/16</a:t>
+              <a:t>5/29/16</a:t>
             </a:fld>
             <a:endParaRPr lang="en-US"/>
           </a:p>
@@ -1491,7 +1491,7 @@
           <a:p>
             <a:fld id="{CDEDE331-6CCF-8044-89C3-DFD0750C62A8}" type="datetimeFigureOut">
               <a:rPr lang="en-US" smtClean="0"/>
-              <a:t>5/28/16</a:t>
+              <a:t>5/29/16</a:t>
             </a:fld>
             <a:endParaRPr lang="en-US"/>
           </a:p>
@@ -1779,7 +1779,7 @@
           <a:p>
             <a:fld id="{CDEDE331-6CCF-8044-89C3-DFD0750C62A8}" type="datetimeFigureOut">
               <a:rPr lang="en-US" smtClean="0"/>
-              <a:t>5/28/16</a:t>
+              <a:t>5/29/16</a:t>
             </a:fld>
             <a:endParaRPr lang="en-US"/>
           </a:p>
@@ -2201,7 +2201,7 @@
           <a:p>
             <a:fld id="{CDEDE331-6CCF-8044-89C3-DFD0750C62A8}" type="datetimeFigureOut">
               <a:rPr lang="en-US" smtClean="0"/>
-              <a:t>5/28/16</a:t>
+              <a:t>5/29/16</a:t>
             </a:fld>
             <a:endParaRPr lang="en-US"/>
           </a:p>
@@ -2319,7 +2319,7 @@
           <a:p>
             <a:fld id="{CDEDE331-6CCF-8044-89C3-DFD0750C62A8}" type="datetimeFigureOut">
               <a:rPr lang="en-US" smtClean="0"/>
-              <a:t>5/28/16</a:t>
+              <a:t>5/29/16</a:t>
             </a:fld>
             <a:endParaRPr lang="en-US"/>
           </a:p>
@@ -2414,7 +2414,7 @@
           <a:p>
             <a:fld id="{CDEDE331-6CCF-8044-89C3-DFD0750C62A8}" type="datetimeFigureOut">
               <a:rPr lang="en-US" smtClean="0"/>
-              <a:t>5/28/16</a:t>
+              <a:t>5/29/16</a:t>
             </a:fld>
             <a:endParaRPr lang="en-US"/>
           </a:p>
@@ -2691,7 +2691,7 @@
           <a:p>
             <a:fld id="{CDEDE331-6CCF-8044-89C3-DFD0750C62A8}" type="datetimeFigureOut">
               <a:rPr lang="en-US" smtClean="0"/>
-              <a:t>5/28/16</a:t>
+              <a:t>5/29/16</a:t>
             </a:fld>
             <a:endParaRPr lang="en-US"/>
           </a:p>
@@ -2944,7 +2944,7 @@
           <a:p>
             <a:fld id="{CDEDE331-6CCF-8044-89C3-DFD0750C62A8}" type="datetimeFigureOut">
               <a:rPr lang="en-US" smtClean="0"/>
-              <a:t>5/28/16</a:t>
+              <a:t>5/29/16</a:t>
             </a:fld>
             <a:endParaRPr lang="en-US"/>
           </a:p>
@@ -3157,7 +3157,7 @@
           <a:p>
             <a:fld id="{CDEDE331-6CCF-8044-89C3-DFD0750C62A8}" type="datetimeFigureOut">
               <a:rPr lang="en-US" smtClean="0"/>
-              <a:t>5/28/16</a:t>
+              <a:t>5/29/16</a:t>
             </a:fld>
             <a:endParaRPr lang="en-US"/>
           </a:p>
@@ -3543,8 +3543,8 @@
         </p:nvCxnSpPr>
         <p:spPr>
           <a:xfrm flipH="1" flipV="1">
-            <a:off x="2556619" y="1418680"/>
-            <a:ext cx="2024640" cy="634121"/>
+            <a:off x="2556619" y="1970176"/>
+            <a:ext cx="2024640" cy="467001"/>
           </a:xfrm>
           <a:prstGeom prst="straightConnector1">
             <a:avLst/>
@@ -3584,8 +3584,8 @@
         </p:nvCxnSpPr>
         <p:spPr>
           <a:xfrm flipH="1" flipV="1">
-            <a:off x="3643048" y="1418680"/>
-            <a:ext cx="929453" cy="634121"/>
+            <a:off x="3643048" y="1970176"/>
+            <a:ext cx="929453" cy="467001"/>
           </a:xfrm>
           <a:prstGeom prst="straightConnector1">
             <a:avLst/>
@@ -3625,8 +3625,8 @@
         </p:nvCxnSpPr>
         <p:spPr>
           <a:xfrm flipV="1">
-            <a:off x="4581259" y="1418680"/>
-            <a:ext cx="863635" cy="634121"/>
+            <a:off x="4581259" y="1970176"/>
+            <a:ext cx="863635" cy="467001"/>
           </a:xfrm>
           <a:prstGeom prst="straightConnector1">
             <a:avLst/>
@@ -3666,8 +3666,8 @@
         </p:nvCxnSpPr>
         <p:spPr>
           <a:xfrm flipV="1">
-            <a:off x="4581259" y="1418680"/>
-            <a:ext cx="1950064" cy="634121"/>
+            <a:off x="4581259" y="1970176"/>
+            <a:ext cx="1950064" cy="467001"/>
           </a:xfrm>
           <a:prstGeom prst="straightConnector1">
             <a:avLst/>
@@ -3704,7 +3704,7 @@
         </p:nvSpPr>
         <p:spPr>
           <a:xfrm>
-            <a:off x="4149194" y="2029941"/>
+            <a:off x="4149194" y="2414317"/>
             <a:ext cx="423307" cy="45719"/>
           </a:xfrm>
           <a:prstGeom prst="rect">
@@ -3753,8 +3753,8 @@
         </p:nvCxnSpPr>
         <p:spPr>
           <a:xfrm flipV="1">
-            <a:off x="1676069" y="2075660"/>
-            <a:ext cx="2684779" cy="1046881"/>
+            <a:off x="1676069" y="2460036"/>
+            <a:ext cx="2684779" cy="662505"/>
           </a:xfrm>
           <a:prstGeom prst="straightConnector1">
             <a:avLst/>
@@ -4224,7 +4224,7 @@
         </p:nvSpPr>
         <p:spPr>
           <a:xfrm>
-            <a:off x="1464415" y="5166989"/>
+            <a:off x="1464415" y="4999869"/>
             <a:ext cx="423307" cy="395067"/>
           </a:xfrm>
           <a:prstGeom prst="rect">
@@ -4270,7 +4270,7 @@
         </p:nvSpPr>
         <p:spPr>
           <a:xfrm>
-            <a:off x="2432215" y="5166989"/>
+            <a:off x="2432215" y="4999869"/>
             <a:ext cx="423307" cy="395067"/>
           </a:xfrm>
           <a:prstGeom prst="rect">
@@ -4316,7 +4316,7 @@
         </p:nvSpPr>
         <p:spPr>
           <a:xfrm>
-            <a:off x="3400015" y="5166989"/>
+            <a:off x="3400015" y="4999869"/>
             <a:ext cx="423307" cy="395067"/>
           </a:xfrm>
           <a:prstGeom prst="rect">
@@ -4362,7 +4362,7 @@
         </p:nvSpPr>
         <p:spPr>
           <a:xfrm>
-            <a:off x="7253016" y="5166989"/>
+            <a:off x="7253016" y="4999869"/>
             <a:ext cx="423307" cy="395067"/>
           </a:xfrm>
           <a:prstGeom prst="rect">
@@ -4408,7 +4408,7 @@
         </p:nvSpPr>
         <p:spPr>
           <a:xfrm>
-            <a:off x="5317418" y="5166989"/>
+            <a:off x="5317418" y="4999869"/>
             <a:ext cx="423307" cy="395067"/>
           </a:xfrm>
           <a:prstGeom prst="rect">
@@ -4454,7 +4454,7 @@
         </p:nvSpPr>
         <p:spPr>
           <a:xfrm>
-            <a:off x="6285218" y="5166989"/>
+            <a:off x="6285218" y="4999869"/>
             <a:ext cx="423307" cy="395067"/>
           </a:xfrm>
           <a:prstGeom prst="rect">
@@ -5562,7 +5562,7 @@
         <p:spPr>
           <a:xfrm flipV="1">
             <a:off x="1676069" y="4539832"/>
-            <a:ext cx="0" cy="627157"/>
+            <a:ext cx="0" cy="460037"/>
           </a:xfrm>
           <a:prstGeom prst="straightConnector1">
             <a:avLst/>
@@ -5592,13 +5592,16 @@
       <p:cxnSp>
         <p:nvCxnSpPr>
           <p:cNvPr id="48" name="Straight Arrow Connector 47"/>
-          <p:cNvCxnSpPr/>
+          <p:cNvCxnSpPr>
+            <a:stCxn id="5" idx="0"/>
+            <a:endCxn id="11" idx="2"/>
+          </p:cNvCxnSpPr>
           <p:nvPr/>
         </p:nvCxnSpPr>
         <p:spPr>
           <a:xfrm flipV="1">
-            <a:off x="2640761" y="4539832"/>
-            <a:ext cx="0" cy="627157"/>
+            <a:off x="2643869" y="4539832"/>
+            <a:ext cx="0" cy="460037"/>
           </a:xfrm>
           <a:prstGeom prst="straightConnector1">
             <a:avLst/>
@@ -5628,13 +5631,16 @@
       <p:cxnSp>
         <p:nvCxnSpPr>
           <p:cNvPr id="49" name="Straight Arrow Connector 48"/>
-          <p:cNvCxnSpPr/>
+          <p:cNvCxnSpPr>
+            <a:stCxn id="6" idx="0"/>
+            <a:endCxn id="12" idx="2"/>
+          </p:cNvCxnSpPr>
           <p:nvPr/>
         </p:nvCxnSpPr>
         <p:spPr>
           <a:xfrm flipV="1">
-            <a:off x="3601782" y="4539832"/>
-            <a:ext cx="0" cy="627157"/>
+            <a:off x="3611669" y="4539832"/>
+            <a:ext cx="0" cy="460037"/>
           </a:xfrm>
           <a:prstGeom prst="straightConnector1">
             <a:avLst/>
@@ -5880,13 +5886,16 @@
       <p:cxnSp>
         <p:nvCxnSpPr>
           <p:cNvPr id="56" name="Straight Arrow Connector 55"/>
-          <p:cNvCxnSpPr/>
+          <p:cNvCxnSpPr>
+            <a:stCxn id="8" idx="0"/>
+            <a:endCxn id="14" idx="2"/>
+          </p:cNvCxnSpPr>
           <p:nvPr/>
         </p:nvCxnSpPr>
         <p:spPr>
           <a:xfrm flipV="1">
-            <a:off x="5523824" y="4539832"/>
-            <a:ext cx="0" cy="627157"/>
+            <a:off x="5529072" y="4539832"/>
+            <a:ext cx="0" cy="460037"/>
           </a:xfrm>
           <a:prstGeom prst="straightConnector1">
             <a:avLst/>
@@ -5916,13 +5925,16 @@
       <p:cxnSp>
         <p:nvCxnSpPr>
           <p:cNvPr id="57" name="Straight Arrow Connector 56"/>
-          <p:cNvCxnSpPr/>
+          <p:cNvCxnSpPr>
+            <a:stCxn id="9" idx="0"/>
+            <a:endCxn id="15" idx="2"/>
+          </p:cNvCxnSpPr>
           <p:nvPr/>
         </p:nvCxnSpPr>
         <p:spPr>
           <a:xfrm flipV="1">
-            <a:off x="6488516" y="4539832"/>
-            <a:ext cx="0" cy="627157"/>
+            <a:off x="6496872" y="4539832"/>
+            <a:ext cx="0" cy="460037"/>
           </a:xfrm>
           <a:prstGeom prst="straightConnector1">
             <a:avLst/>
@@ -5952,13 +5964,16 @@
       <p:cxnSp>
         <p:nvCxnSpPr>
           <p:cNvPr id="58" name="Straight Arrow Connector 57"/>
-          <p:cNvCxnSpPr/>
+          <p:cNvCxnSpPr>
+            <a:stCxn id="7" idx="0"/>
+            <a:endCxn id="13" idx="2"/>
+          </p:cNvCxnSpPr>
           <p:nvPr/>
         </p:nvCxnSpPr>
         <p:spPr>
           <a:xfrm flipV="1">
-            <a:off x="7449537" y="4539832"/>
-            <a:ext cx="0" cy="627157"/>
+            <a:off x="7464670" y="4539832"/>
+            <a:ext cx="0" cy="460037"/>
           </a:xfrm>
           <a:prstGeom prst="straightConnector1">
             <a:avLst/>
@@ -6213,7 +6228,7 @@
         <p:spPr>
           <a:xfrm flipV="1">
             <a:off x="1676069" y="4201975"/>
-            <a:ext cx="354661" cy="965014"/>
+            <a:ext cx="354661" cy="797894"/>
           </a:xfrm>
           <a:prstGeom prst="straightConnector1">
             <a:avLst/>
@@ -6243,13 +6258,15 @@
       <p:cxnSp>
         <p:nvCxnSpPr>
           <p:cNvPr id="67" name="Straight Arrow Connector 66"/>
-          <p:cNvCxnSpPr/>
+          <p:cNvCxnSpPr>
+            <a:stCxn id="5" idx="0"/>
+          </p:cNvCxnSpPr>
           <p:nvPr/>
         </p:nvCxnSpPr>
         <p:spPr>
           <a:xfrm flipV="1">
-            <a:off x="2653826" y="4201975"/>
-            <a:ext cx="354661" cy="965014"/>
+            <a:off x="2643869" y="4201975"/>
+            <a:ext cx="364618" cy="797894"/>
           </a:xfrm>
           <a:prstGeom prst="straightConnector1">
             <a:avLst/>
@@ -6279,13 +6296,15 @@
       <p:cxnSp>
         <p:nvCxnSpPr>
           <p:cNvPr id="68" name="Straight Arrow Connector 67"/>
-          <p:cNvCxnSpPr/>
+          <p:cNvCxnSpPr>
+            <a:stCxn id="6" idx="0"/>
+          </p:cNvCxnSpPr>
           <p:nvPr/>
         </p:nvCxnSpPr>
         <p:spPr>
           <a:xfrm flipV="1">
-            <a:off x="3601782" y="4201975"/>
-            <a:ext cx="354661" cy="965014"/>
+            <a:off x="3611669" y="4201975"/>
+            <a:ext cx="344774" cy="797894"/>
           </a:xfrm>
           <a:prstGeom prst="straightConnector1">
             <a:avLst/>
@@ -6315,13 +6334,15 @@
       <p:cxnSp>
         <p:nvCxnSpPr>
           <p:cNvPr id="69" name="Straight Arrow Connector 68"/>
-          <p:cNvCxnSpPr/>
+          <p:cNvCxnSpPr>
+            <a:stCxn id="8" idx="0"/>
+          </p:cNvCxnSpPr>
           <p:nvPr/>
         </p:nvCxnSpPr>
         <p:spPr>
           <a:xfrm flipV="1">
-            <a:off x="5523825" y="4201975"/>
-            <a:ext cx="354661" cy="965014"/>
+            <a:off x="5529072" y="4201975"/>
+            <a:ext cx="349414" cy="797894"/>
           </a:xfrm>
           <a:prstGeom prst="straightConnector1">
             <a:avLst/>
@@ -6351,13 +6372,15 @@
       <p:cxnSp>
         <p:nvCxnSpPr>
           <p:cNvPr id="70" name="Straight Arrow Connector 69"/>
-          <p:cNvCxnSpPr/>
+          <p:cNvCxnSpPr>
+            <a:stCxn id="9" idx="0"/>
+          </p:cNvCxnSpPr>
           <p:nvPr/>
         </p:nvCxnSpPr>
         <p:spPr>
           <a:xfrm flipV="1">
-            <a:off x="6501582" y="4201975"/>
-            <a:ext cx="354661" cy="965014"/>
+            <a:off x="6496872" y="4201975"/>
+            <a:ext cx="359371" cy="797894"/>
           </a:xfrm>
           <a:prstGeom prst="straightConnector1">
             <a:avLst/>
@@ -6387,13 +6410,15 @@
       <p:cxnSp>
         <p:nvCxnSpPr>
           <p:cNvPr id="71" name="Straight Arrow Connector 70"/>
-          <p:cNvCxnSpPr/>
+          <p:cNvCxnSpPr>
+            <a:stCxn id="7" idx="0"/>
+          </p:cNvCxnSpPr>
           <p:nvPr/>
         </p:nvCxnSpPr>
         <p:spPr>
           <a:xfrm flipV="1">
-            <a:off x="7449538" y="4201975"/>
-            <a:ext cx="354661" cy="965014"/>
+            <a:off x="7464670" y="4201975"/>
+            <a:ext cx="339529" cy="797894"/>
           </a:xfrm>
           <a:prstGeom prst="straightConnector1">
             <a:avLst/>
@@ -6985,7 +7010,7 @@
         </p:nvSpPr>
         <p:spPr>
           <a:xfrm>
-            <a:off x="4442239" y="5179632"/>
+            <a:off x="4442239" y="5012512"/>
             <a:ext cx="308899" cy="369332"/>
           </a:xfrm>
           <a:prstGeom prst="rect">
@@ -7015,7 +7040,7 @@
         </p:nvSpPr>
         <p:spPr>
           <a:xfrm>
-            <a:off x="4581259" y="2029941"/>
+            <a:off x="4581259" y="2414317"/>
             <a:ext cx="423307" cy="45719"/>
           </a:xfrm>
           <a:prstGeom prst="rect">
@@ -7064,8 +7089,8 @@
         </p:nvCxnSpPr>
         <p:spPr>
           <a:xfrm flipH="1" flipV="1">
-            <a:off x="4792913" y="2075660"/>
-            <a:ext cx="3026418" cy="709024"/>
+            <a:off x="4792913" y="2460036"/>
+            <a:ext cx="3026418" cy="324648"/>
           </a:xfrm>
           <a:prstGeom prst="straightConnector1">
             <a:avLst/>
@@ -7100,7 +7125,7 @@
         </p:nvSpPr>
         <p:spPr>
           <a:xfrm>
-            <a:off x="2344965" y="1023613"/>
+            <a:off x="2344965" y="1575109"/>
             <a:ext cx="423307" cy="395067"/>
           </a:xfrm>
           <a:prstGeom prst="rect">
@@ -7146,7 +7171,7 @@
         </p:nvSpPr>
         <p:spPr>
           <a:xfrm>
-            <a:off x="3431394" y="1023613"/>
+            <a:off x="3431394" y="1575109"/>
             <a:ext cx="423307" cy="395067"/>
           </a:xfrm>
           <a:prstGeom prst="rect">
@@ -7192,7 +7217,7 @@
         </p:nvSpPr>
         <p:spPr>
           <a:xfrm>
-            <a:off x="5233240" y="1023613"/>
+            <a:off x="5233240" y="1575109"/>
             <a:ext cx="423307" cy="395067"/>
           </a:xfrm>
           <a:prstGeom prst="rect">
@@ -7238,7 +7263,7 @@
         </p:nvSpPr>
         <p:spPr>
           <a:xfrm>
-            <a:off x="6319669" y="1023613"/>
+            <a:off x="6319669" y="1575109"/>
             <a:ext cx="423307" cy="395067"/>
           </a:xfrm>
           <a:prstGeom prst="rect">
@@ -7284,7 +7309,7 @@
         </p:nvSpPr>
         <p:spPr>
           <a:xfrm>
-            <a:off x="4418051" y="1042095"/>
+            <a:off x="4418051" y="1593591"/>
             <a:ext cx="308899" cy="369332"/>
           </a:xfrm>
           <a:prstGeom prst="rect">
@@ -7314,7 +7339,7 @@
         </p:nvSpPr>
         <p:spPr>
           <a:xfrm>
-            <a:off x="2047440" y="304237"/>
+            <a:off x="2047440" y="855733"/>
             <a:ext cx="977757" cy="430887"/>
           </a:xfrm>
           <a:prstGeom prst="rect">
@@ -7345,7 +7370,7 @@
         </p:nvSpPr>
         <p:spPr>
           <a:xfrm>
-            <a:off x="3154169" y="304237"/>
+            <a:off x="3154169" y="855733"/>
             <a:ext cx="977757" cy="430887"/>
           </a:xfrm>
           <a:prstGeom prst="rect">
@@ -7376,7 +7401,7 @@
         </p:nvSpPr>
         <p:spPr>
           <a:xfrm>
-            <a:off x="4956015" y="304237"/>
+            <a:off x="4956015" y="855733"/>
             <a:ext cx="977757" cy="430887"/>
           </a:xfrm>
           <a:prstGeom prst="rect">
@@ -7415,7 +7440,7 @@
         </p:nvSpPr>
         <p:spPr>
           <a:xfrm>
-            <a:off x="6042444" y="304237"/>
+            <a:off x="6042444" y="855733"/>
             <a:ext cx="977757" cy="430887"/>
           </a:xfrm>
           <a:prstGeom prst="rect">
@@ -7454,7 +7479,7 @@
         </p:nvCxnSpPr>
         <p:spPr>
           <a:xfrm flipV="1">
-            <a:off x="1667759" y="5562056"/>
+            <a:off x="1667759" y="5394936"/>
             <a:ext cx="0" cy="274320"/>
           </a:xfrm>
           <a:prstGeom prst="straightConnector1">
@@ -7490,7 +7515,7 @@
         </p:nvCxnSpPr>
         <p:spPr>
           <a:xfrm flipV="1">
-            <a:off x="2632451" y="5562056"/>
+            <a:off x="2632451" y="5394936"/>
             <a:ext cx="0" cy="274320"/>
           </a:xfrm>
           <a:prstGeom prst="straightConnector1">
@@ -7526,7 +7551,7 @@
         </p:nvCxnSpPr>
         <p:spPr>
           <a:xfrm flipV="1">
-            <a:off x="3593472" y="5562056"/>
+            <a:off x="3593472" y="5394936"/>
             <a:ext cx="0" cy="274320"/>
           </a:xfrm>
           <a:prstGeom prst="straightConnector1">
@@ -7562,7 +7587,7 @@
         </p:nvCxnSpPr>
         <p:spPr>
           <a:xfrm flipV="1">
-            <a:off x="5536051" y="5562056"/>
+            <a:off x="5536051" y="5394936"/>
             <a:ext cx="0" cy="274320"/>
           </a:xfrm>
           <a:prstGeom prst="straightConnector1">
@@ -7598,7 +7623,7 @@
         </p:nvCxnSpPr>
         <p:spPr>
           <a:xfrm flipV="1">
-            <a:off x="6500743" y="5562056"/>
+            <a:off x="6500743" y="5394936"/>
             <a:ext cx="0" cy="274320"/>
           </a:xfrm>
           <a:prstGeom prst="straightConnector1">
@@ -7634,7 +7659,7 @@
         </p:nvCxnSpPr>
         <p:spPr>
           <a:xfrm flipV="1">
-            <a:off x="7461764" y="5562056"/>
+            <a:off x="7461764" y="5394936"/>
             <a:ext cx="0" cy="274320"/>
           </a:xfrm>
           <a:prstGeom prst="straightConnector1">
@@ -7670,7 +7695,7 @@
         </p:nvSpPr>
         <p:spPr>
           <a:xfrm>
-            <a:off x="1514148" y="5854951"/>
+            <a:off x="1514148" y="5687831"/>
             <a:ext cx="308899" cy="369332"/>
           </a:xfrm>
           <a:prstGeom prst="rect">
@@ -7686,10 +7711,18 @@
           <a:p>
             <a:pPr algn="ctr"/>
             <a:r>
-              <a:rPr lang="en-US" dirty="0" smtClean="0"/>
+              <a:rPr lang="en-US" dirty="0" smtClean="0">
+                <a:solidFill>
+                  <a:srgbClr val="008000"/>
+                </a:solidFill>
+              </a:rPr>
               <a:t>A</a:t>
             </a:r>
-            <a:endParaRPr lang="en-US" dirty="0"/>
+            <a:endParaRPr lang="en-US" dirty="0">
+              <a:solidFill>
+                <a:srgbClr val="008000"/>
+              </a:solidFill>
+            </a:endParaRPr>
           </a:p>
         </p:txBody>
       </p:sp>
@@ -7701,7 +7734,7 @@
         </p:nvSpPr>
         <p:spPr>
           <a:xfrm>
-            <a:off x="4442239" y="5787708"/>
+            <a:off x="4442239" y="5620588"/>
             <a:ext cx="308899" cy="369332"/>
           </a:xfrm>
           <a:prstGeom prst="rect">
@@ -7732,7 +7765,7 @@
         </p:nvSpPr>
         <p:spPr>
           <a:xfrm>
-            <a:off x="2478840" y="5854951"/>
+            <a:off x="2478840" y="5687831"/>
             <a:ext cx="308899" cy="369332"/>
           </a:xfrm>
           <a:prstGeom prst="rect">
@@ -7748,10 +7781,18 @@
           <a:p>
             <a:pPr algn="ctr"/>
             <a:r>
-              <a:rPr lang="en-US" dirty="0" smtClean="0"/>
+              <a:rPr lang="en-US" dirty="0" smtClean="0">
+                <a:solidFill>
+                  <a:srgbClr val="FF0000"/>
+                </a:solidFill>
+              </a:rPr>
               <a:t>C</a:t>
             </a:r>
-            <a:endParaRPr lang="en-US" dirty="0"/>
+            <a:endParaRPr lang="en-US" dirty="0">
+              <a:solidFill>
+                <a:srgbClr val="FF0000"/>
+              </a:solidFill>
+            </a:endParaRPr>
           </a:p>
         </p:txBody>
       </p:sp>
@@ -7763,7 +7804,7 @@
         </p:nvSpPr>
         <p:spPr>
           <a:xfrm>
-            <a:off x="3439861" y="5854951"/>
+            <a:off x="3439861" y="5687831"/>
             <a:ext cx="308899" cy="369332"/>
           </a:xfrm>
           <a:prstGeom prst="rect">
@@ -7779,10 +7820,18 @@
           <a:p>
             <a:pPr algn="ctr"/>
             <a:r>
-              <a:rPr lang="en-US" dirty="0" smtClean="0"/>
+              <a:rPr lang="en-US" dirty="0" smtClean="0">
+                <a:solidFill>
+                  <a:srgbClr val="FF6600"/>
+                </a:solidFill>
+              </a:rPr>
               <a:t>T</a:t>
             </a:r>
-            <a:endParaRPr lang="en-US" dirty="0"/>
+            <a:endParaRPr lang="en-US" dirty="0">
+              <a:solidFill>
+                <a:srgbClr val="FF6600"/>
+              </a:solidFill>
+            </a:endParaRPr>
           </a:p>
         </p:txBody>
       </p:sp>
@@ -7794,7 +7843,7 @@
         </p:nvSpPr>
         <p:spPr>
           <a:xfrm>
-            <a:off x="5374130" y="5822685"/>
+            <a:off x="5374130" y="5655565"/>
             <a:ext cx="308899" cy="369332"/>
           </a:xfrm>
           <a:prstGeom prst="rect">
@@ -7810,7 +7859,11 @@
           <a:p>
             <a:pPr algn="ctr"/>
             <a:r>
-              <a:rPr lang="en-US" dirty="0"/>
+              <a:rPr lang="en-US" dirty="0">
+                <a:solidFill>
+                  <a:srgbClr val="3366FF"/>
+                </a:solidFill>
+              </a:rPr>
               <a:t>G</a:t>
             </a:r>
           </a:p>
@@ -7824,7 +7877,7 @@
         </p:nvSpPr>
         <p:spPr>
           <a:xfrm>
-            <a:off x="6338822" y="5822685"/>
+            <a:off x="6338822" y="5655565"/>
             <a:ext cx="308899" cy="369332"/>
           </a:xfrm>
           <a:prstGeom prst="rect">
@@ -7840,10 +7893,18 @@
           <a:p>
             <a:pPr algn="ctr"/>
             <a:r>
-              <a:rPr lang="en-US" dirty="0" smtClean="0"/>
+              <a:rPr lang="en-US" dirty="0" smtClean="0">
+                <a:solidFill>
+                  <a:srgbClr val="3366FF"/>
+                </a:solidFill>
+              </a:rPr>
               <a:t>G</a:t>
             </a:r>
-            <a:endParaRPr lang="en-US" dirty="0"/>
+            <a:endParaRPr lang="en-US" dirty="0">
+              <a:solidFill>
+                <a:srgbClr val="3366FF"/>
+              </a:solidFill>
+            </a:endParaRPr>
           </a:p>
         </p:txBody>
       </p:sp>
@@ -7855,7 +7916,7 @@
         </p:nvSpPr>
         <p:spPr>
           <a:xfrm>
-            <a:off x="7299843" y="5822685"/>
+            <a:off x="7299843" y="5655565"/>
             <a:ext cx="308899" cy="369332"/>
           </a:xfrm>
           <a:prstGeom prst="rect">
@@ -7871,10 +7932,18 @@
           <a:p>
             <a:pPr algn="ctr"/>
             <a:r>
-              <a:rPr lang="en-US" dirty="0" smtClean="0"/>
+              <a:rPr lang="en-US" dirty="0" smtClean="0">
+                <a:solidFill>
+                  <a:srgbClr val="FF0000"/>
+                </a:solidFill>
+              </a:rPr>
               <a:t>C</a:t>
             </a:r>
-            <a:endParaRPr lang="en-US" dirty="0"/>
+            <a:endParaRPr lang="en-US" dirty="0">
+              <a:solidFill>
+                <a:srgbClr val="FF0000"/>
+              </a:solidFill>
+            </a:endParaRPr>
           </a:p>
         </p:txBody>
       </p:sp>
@@ -7886,7 +7955,7 @@
         </p:nvCxnSpPr>
         <p:spPr>
           <a:xfrm flipV="1">
-            <a:off x="2556619" y="749293"/>
+            <a:off x="2556619" y="1300789"/>
             <a:ext cx="0" cy="274320"/>
           </a:xfrm>
           <a:prstGeom prst="straightConnector1">
@@ -7922,7 +7991,7 @@
         </p:nvCxnSpPr>
         <p:spPr>
           <a:xfrm flipV="1">
-            <a:off x="3643048" y="749293"/>
+            <a:off x="3643048" y="1300789"/>
             <a:ext cx="0" cy="274320"/>
           </a:xfrm>
           <a:prstGeom prst="straightConnector1">
@@ -7958,7 +8027,7 @@
         </p:nvCxnSpPr>
         <p:spPr>
           <a:xfrm flipV="1">
-            <a:off x="5444894" y="749293"/>
+            <a:off x="5444894" y="1300789"/>
             <a:ext cx="0" cy="274320"/>
           </a:xfrm>
           <a:prstGeom prst="straightConnector1">
@@ -7994,7 +8063,7 @@
         </p:nvCxnSpPr>
         <p:spPr>
           <a:xfrm flipV="1">
-            <a:off x="6531323" y="749293"/>
+            <a:off x="6531323" y="1300789"/>
             <a:ext cx="0" cy="274320"/>
           </a:xfrm>
           <a:prstGeom prst="straightConnector1">
@@ -8030,7 +8099,7 @@
         </p:nvSpPr>
         <p:spPr>
           <a:xfrm>
-            <a:off x="426431" y="5179632"/>
+            <a:off x="426431" y="5012512"/>
             <a:ext cx="938306" cy="430887"/>
           </a:xfrm>
           <a:prstGeom prst="rect">
@@ -8147,7 +8216,7 @@
         </p:nvSpPr>
         <p:spPr>
           <a:xfrm>
-            <a:off x="426431" y="1098237"/>
+            <a:off x="426431" y="1649733"/>
             <a:ext cx="938306" cy="261610"/>
           </a:xfrm>
           <a:prstGeom prst="rect">

</xml_diff>